<commit_message>
add background add switch btn SFX adjust layout
</commit_message>
<xml_diff>
--- a/Preview Images/drawboard.pptx
+++ b/Preview Images/drawboard.pptx
@@ -105,6 +105,11 @@
       </a:defRPr>
     </a:lvl9pPr>
   </p:defaultTextStyle>
+  <p:extLst>
+    <p:ext uri="{EFAFB233-063F-42B5-8137-9DF3F51BA10A}">
+      <p15:sldGuideLst xmlns:p15="http://schemas.microsoft.com/office/powerpoint/2012/main"/>
+    </p:ext>
+  </p:extLst>
 </p:presentation>
 </file>
 
@@ -2967,7 +2972,7 @@
       </p:grpSpPr>
       <p:grpSp>
         <p:nvGrpSpPr>
-          <p:cNvPr id="25" name="群組 24"/>
+          <p:cNvPr id="24" name="群組 23"/>
           <p:cNvGrpSpPr/>
           <p:nvPr/>
         </p:nvGrpSpPr>
@@ -2979,333 +2984,305 @@
             <a:chExt cx="9144001" cy="6858000"/>
           </a:xfrm>
         </p:grpSpPr>
-        <p:grpSp>
-          <p:nvGrpSpPr>
-            <p:cNvPr id="24" name="群組 23"/>
-            <p:cNvGrpSpPr/>
+        <p:pic>
+          <p:nvPicPr>
+            <p:cNvPr id="4" name="圖片 3"/>
+            <p:cNvPicPr>
+              <a:picLocks noChangeAspect="1"/>
+            </p:cNvPicPr>
             <p:nvPr/>
-          </p:nvGrpSpPr>
-          <p:grpSpPr>
+          </p:nvPicPr>
+          <p:blipFill>
+            <a:blip r:embed="rId2">
+              <a:extLst>
+                <a:ext uri="{28A0092B-C50C-407E-A947-70E740481C1C}">
+                  <a14:useLocalDpi xmlns:a14="http://schemas.microsoft.com/office/drawing/2010/main" val="0"/>
+                </a:ext>
+              </a:extLst>
+            </a:blip>
+            <a:stretch>
+              <a:fillRect/>
+            </a:stretch>
+          </p:blipFill>
+          <p:spPr>
             <a:xfrm>
               <a:off x="868679" y="0"/>
               <a:ext cx="9144001" cy="6858000"/>
-              <a:chOff x="868679" y="0"/>
-              <a:chExt cx="9144001" cy="6858000"/>
             </a:xfrm>
-          </p:grpSpPr>
-          <p:pic>
-            <p:nvPicPr>
-              <p:cNvPr id="4" name="圖片 3"/>
-              <p:cNvPicPr>
-                <a:picLocks noChangeAspect="1"/>
-              </p:cNvPicPr>
-              <p:nvPr/>
-            </p:nvPicPr>
-            <p:blipFill>
-              <a:blip r:embed="rId2">
-                <a:extLst>
-                  <a:ext uri="{28A0092B-C50C-407E-A947-70E740481C1C}">
-                    <a14:useLocalDpi xmlns:a14="http://schemas.microsoft.com/office/drawing/2010/main" val="0"/>
-                  </a:ext>
-                </a:extLst>
-              </a:blip>
-              <a:stretch>
-                <a:fillRect/>
-              </a:stretch>
-            </p:blipFill>
-            <p:spPr>
-              <a:xfrm>
-                <a:off x="868679" y="0"/>
-                <a:ext cx="9144001" cy="6858000"/>
-              </a:xfrm>
-              <a:prstGeom prst="rect">
-                <a:avLst/>
-              </a:prstGeom>
-            </p:spPr>
-          </p:pic>
-          <p:sp>
-            <p:nvSpPr>
-              <p:cNvPr id="17" name="矩形 16"/>
-              <p:cNvSpPr/>
-              <p:nvPr/>
-            </p:nvSpPr>
-            <p:spPr>
-              <a:xfrm rot="2104840">
-                <a:off x="1053427" y="4175782"/>
-                <a:ext cx="1292045" cy="975765"/>
-              </a:xfrm>
-              <a:prstGeom prst="rect">
-                <a:avLst/>
-              </a:prstGeom>
-              <a:solidFill>
-                <a:srgbClr val="082908"/>
-              </a:solidFill>
-              <a:ln>
-                <a:noFill/>
-              </a:ln>
-            </p:spPr>
-            <p:style>
-              <a:lnRef idx="2">
-                <a:schemeClr val="accent1">
-                  <a:shade val="50000"/>
-                </a:schemeClr>
-              </a:lnRef>
-              <a:fillRef idx="1">
-                <a:schemeClr val="accent1"/>
-              </a:fillRef>
-              <a:effectRef idx="0">
-                <a:schemeClr val="accent1"/>
-              </a:effectRef>
-              <a:fontRef idx="minor">
-                <a:schemeClr val="lt1"/>
-              </a:fontRef>
-            </p:style>
-            <p:txBody>
-              <a:bodyPr rtlCol="0" anchor="ctr"/>
-              <a:lstStyle/>
-              <a:p>
-                <a:pPr algn="ctr"/>
-                <a:endParaRPr lang="zh-TW" altLang="en-US"/>
-              </a:p>
-            </p:txBody>
-          </p:sp>
-          <p:sp>
-            <p:nvSpPr>
-              <p:cNvPr id="18" name="矩形 17"/>
-              <p:cNvSpPr/>
-              <p:nvPr/>
-            </p:nvSpPr>
-            <p:spPr>
-              <a:xfrm>
-                <a:off x="2087880" y="6239580"/>
-                <a:ext cx="2241503" cy="615201"/>
-              </a:xfrm>
-              <a:prstGeom prst="rect">
-                <a:avLst/>
-              </a:prstGeom>
-              <a:solidFill>
-                <a:srgbClr val="082908"/>
-              </a:solidFill>
-              <a:ln>
-                <a:noFill/>
-              </a:ln>
-            </p:spPr>
-            <p:style>
-              <a:lnRef idx="2">
-                <a:schemeClr val="accent1">
-                  <a:shade val="50000"/>
-                </a:schemeClr>
-              </a:lnRef>
-              <a:fillRef idx="1">
-                <a:schemeClr val="accent1"/>
-              </a:fillRef>
-              <a:effectRef idx="0">
-                <a:schemeClr val="accent1"/>
-              </a:effectRef>
-              <a:fontRef idx="minor">
-                <a:schemeClr val="lt1"/>
-              </a:fontRef>
-            </p:style>
-            <p:txBody>
-              <a:bodyPr rtlCol="0" anchor="ctr"/>
-              <a:lstStyle/>
-              <a:p>
-                <a:pPr algn="ctr"/>
-                <a:endParaRPr lang="zh-TW" altLang="en-US"/>
-              </a:p>
-            </p:txBody>
-          </p:sp>
-          <p:sp>
-            <p:nvSpPr>
-              <p:cNvPr id="21" name="矩形 20"/>
-              <p:cNvSpPr/>
-              <p:nvPr/>
-            </p:nvSpPr>
-            <p:spPr>
-              <a:xfrm rot="5400000">
-                <a:off x="1809076" y="5276026"/>
-                <a:ext cx="1292045" cy="975765"/>
-              </a:xfrm>
-              <a:prstGeom prst="rect">
-                <a:avLst/>
-              </a:prstGeom>
-              <a:solidFill>
-                <a:srgbClr val="082908"/>
-              </a:solidFill>
-              <a:ln>
-                <a:noFill/>
-              </a:ln>
-            </p:spPr>
-            <p:style>
-              <a:lnRef idx="2">
-                <a:schemeClr val="accent1">
-                  <a:shade val="50000"/>
-                </a:schemeClr>
-              </a:lnRef>
-              <a:fillRef idx="1">
-                <a:schemeClr val="accent1"/>
-              </a:fillRef>
-              <a:effectRef idx="0">
-                <a:schemeClr val="accent1"/>
-              </a:effectRef>
-              <a:fontRef idx="minor">
-                <a:schemeClr val="lt1"/>
-              </a:fontRef>
-            </p:style>
-            <p:txBody>
-              <a:bodyPr rtlCol="0" anchor="ctr"/>
-              <a:lstStyle/>
-              <a:p>
-                <a:pPr algn="ctr"/>
-                <a:endParaRPr lang="zh-TW" altLang="en-US"/>
-              </a:p>
-            </p:txBody>
-          </p:sp>
-          <p:sp>
-            <p:nvSpPr>
-              <p:cNvPr id="22" name="矩形 21"/>
-              <p:cNvSpPr/>
-              <p:nvPr/>
-            </p:nvSpPr>
-            <p:spPr>
-              <a:xfrm rot="3471389">
-                <a:off x="2471299" y="5359650"/>
-                <a:ext cx="1670546" cy="954491"/>
-              </a:xfrm>
-              <a:prstGeom prst="rect">
-                <a:avLst/>
-              </a:prstGeom>
-              <a:solidFill>
-                <a:srgbClr val="082908"/>
-              </a:solidFill>
-              <a:ln>
-                <a:noFill/>
-              </a:ln>
-            </p:spPr>
-            <p:style>
-              <a:lnRef idx="2">
-                <a:schemeClr val="accent1">
-                  <a:shade val="50000"/>
-                </a:schemeClr>
-              </a:lnRef>
-              <a:fillRef idx="1">
-                <a:schemeClr val="accent1"/>
-              </a:fillRef>
-              <a:effectRef idx="0">
-                <a:schemeClr val="accent1"/>
-              </a:effectRef>
-              <a:fontRef idx="minor">
-                <a:schemeClr val="lt1"/>
-              </a:fontRef>
-            </p:style>
-            <p:txBody>
-              <a:bodyPr rtlCol="0" anchor="ctr"/>
-              <a:lstStyle/>
-              <a:p>
-                <a:pPr algn="ctr"/>
-                <a:endParaRPr lang="zh-TW" altLang="en-US"/>
-              </a:p>
-            </p:txBody>
-          </p:sp>
-          <p:sp>
-            <p:nvSpPr>
-              <p:cNvPr id="23" name="矩形 22"/>
-              <p:cNvSpPr/>
-              <p:nvPr/>
-            </p:nvSpPr>
-            <p:spPr>
-              <a:xfrm rot="3471389">
-                <a:off x="3332049" y="3788924"/>
-                <a:ext cx="686408" cy="954491"/>
-              </a:xfrm>
-              <a:prstGeom prst="rect">
-                <a:avLst/>
-              </a:prstGeom>
-              <a:solidFill>
-                <a:srgbClr val="082908"/>
-              </a:solidFill>
-              <a:ln>
-                <a:noFill/>
-              </a:ln>
-            </p:spPr>
-            <p:style>
-              <a:lnRef idx="2">
-                <a:schemeClr val="accent1">
-                  <a:shade val="50000"/>
-                </a:schemeClr>
-              </a:lnRef>
-              <a:fillRef idx="1">
-                <a:schemeClr val="accent1"/>
-              </a:fillRef>
-              <a:effectRef idx="0">
-                <a:schemeClr val="accent1"/>
-              </a:effectRef>
-              <a:fontRef idx="minor">
-                <a:schemeClr val="lt1"/>
-              </a:fontRef>
-            </p:style>
-            <p:txBody>
-              <a:bodyPr rtlCol="0" anchor="ctr"/>
-              <a:lstStyle/>
-              <a:p>
-                <a:pPr algn="ctr"/>
-                <a:endParaRPr lang="zh-TW" altLang="en-US"/>
-              </a:p>
-            </p:txBody>
-          </p:sp>
-        </p:grpSp>
-        <p:grpSp>
-          <p:nvGrpSpPr>
-            <p:cNvPr id="13" name="群組 12"/>
-            <p:cNvGrpSpPr/>
+            <a:prstGeom prst="rect">
+              <a:avLst/>
+            </a:prstGeom>
+          </p:spPr>
+        </p:pic>
+        <p:sp>
+          <p:nvSpPr>
+            <p:cNvPr id="17" name="矩形 16"/>
+            <p:cNvSpPr/>
             <p:nvPr/>
-          </p:nvGrpSpPr>
-          <p:grpSpPr>
+          </p:nvSpPr>
+          <p:spPr>
+            <a:xfrm rot="2104840">
+              <a:off x="1053427" y="4175782"/>
+              <a:ext cx="1292045" cy="975765"/>
+            </a:xfrm>
+            <a:prstGeom prst="rect">
+              <a:avLst/>
+            </a:prstGeom>
+            <a:solidFill>
+              <a:srgbClr val="082908"/>
+            </a:solidFill>
+            <a:ln>
+              <a:noFill/>
+            </a:ln>
+          </p:spPr>
+          <p:style>
+            <a:lnRef idx="2">
+              <a:schemeClr val="accent1">
+                <a:shade val="50000"/>
+              </a:schemeClr>
+            </a:lnRef>
+            <a:fillRef idx="1">
+              <a:schemeClr val="accent1"/>
+            </a:fillRef>
+            <a:effectRef idx="0">
+              <a:schemeClr val="accent1"/>
+            </a:effectRef>
+            <a:fontRef idx="minor">
+              <a:schemeClr val="lt1"/>
+            </a:fontRef>
+          </p:style>
+          <p:txBody>
+            <a:bodyPr rtlCol="0" anchor="ctr"/>
+            <a:lstStyle/>
+            <a:p>
+              <a:pPr algn="ctr"/>
+              <a:endParaRPr lang="zh-TW" altLang="en-US"/>
+            </a:p>
+          </p:txBody>
+        </p:sp>
+        <p:sp>
+          <p:nvSpPr>
+            <p:cNvPr id="18" name="矩形 17"/>
+            <p:cNvSpPr/>
+            <p:nvPr/>
+          </p:nvSpPr>
+          <p:spPr>
             <a:xfrm>
-              <a:off x="1929214" y="2937306"/>
-              <a:ext cx="1899008" cy="2854205"/>
-              <a:chOff x="4577993" y="2403653"/>
-              <a:chExt cx="1899008" cy="2854205"/>
+              <a:off x="2087880" y="6239580"/>
+              <a:ext cx="2241503" cy="615201"/>
             </a:xfrm>
-          </p:grpSpPr>
-          <p:sp>
-            <p:nvSpPr>
-              <p:cNvPr id="5" name="文字方塊 4"/>
-              <p:cNvSpPr txBox="1"/>
-              <p:nvPr/>
-            </p:nvSpPr>
-            <p:spPr>
-              <a:xfrm>
-                <a:off x="4577993" y="2403653"/>
-                <a:ext cx="1899008" cy="707886"/>
-              </a:xfrm>
-              <a:prstGeom prst="rect">
-                <a:avLst/>
-              </a:prstGeom>
+            <a:prstGeom prst="rect">
+              <a:avLst/>
+            </a:prstGeom>
+            <a:solidFill>
+              <a:srgbClr val="082908"/>
+            </a:solidFill>
+            <a:ln>
               <a:noFill/>
-            </p:spPr>
-            <p:txBody>
-              <a:bodyPr wrap="square" rtlCol="0">
-                <a:spAutoFit/>
-              </a:bodyPr>
-              <a:lstStyle/>
-              <a:p>
-                <a:r>
-                  <a:rPr lang="en-US" altLang="zh-TW" sz="4000" dirty="0" smtClean="0">
-                    <a:ln w="19050">
-                      <a:solidFill>
-                        <a:srgbClr val="041404"/>
-                      </a:solidFill>
-                    </a:ln>
-                    <a:solidFill>
-                      <a:srgbClr val="E6EEE8"/>
-                    </a:solidFill>
-                    <a:latin typeface="FOT-Skip Std B" panose="02020700000000000000" pitchFamily="18" charset="-128"/>
-                    <a:ea typeface="FOT-Skip Std B" panose="02020700000000000000" pitchFamily="18" charset="-128"/>
-                  </a:rPr>
-                  <a:t>option</a:t>
-                </a:r>
-                <a:endParaRPr lang="zh-TW" altLang="en-US" sz="4000" dirty="0">
+            </a:ln>
+          </p:spPr>
+          <p:style>
+            <a:lnRef idx="2">
+              <a:schemeClr val="accent1">
+                <a:shade val="50000"/>
+              </a:schemeClr>
+            </a:lnRef>
+            <a:fillRef idx="1">
+              <a:schemeClr val="accent1"/>
+            </a:fillRef>
+            <a:effectRef idx="0">
+              <a:schemeClr val="accent1"/>
+            </a:effectRef>
+            <a:fontRef idx="minor">
+              <a:schemeClr val="lt1"/>
+            </a:fontRef>
+          </p:style>
+          <p:txBody>
+            <a:bodyPr rtlCol="0" anchor="ctr"/>
+            <a:lstStyle/>
+            <a:p>
+              <a:pPr algn="ctr"/>
+              <a:endParaRPr lang="zh-TW" altLang="en-US"/>
+            </a:p>
+          </p:txBody>
+        </p:sp>
+        <p:sp>
+          <p:nvSpPr>
+            <p:cNvPr id="21" name="矩形 20"/>
+            <p:cNvSpPr/>
+            <p:nvPr/>
+          </p:nvSpPr>
+          <p:spPr>
+            <a:xfrm rot="5400000">
+              <a:off x="1809076" y="5276026"/>
+              <a:ext cx="1292045" cy="975765"/>
+            </a:xfrm>
+            <a:prstGeom prst="rect">
+              <a:avLst/>
+            </a:prstGeom>
+            <a:solidFill>
+              <a:srgbClr val="082908"/>
+            </a:solidFill>
+            <a:ln>
+              <a:noFill/>
+            </a:ln>
+          </p:spPr>
+          <p:style>
+            <a:lnRef idx="2">
+              <a:schemeClr val="accent1">
+                <a:shade val="50000"/>
+              </a:schemeClr>
+            </a:lnRef>
+            <a:fillRef idx="1">
+              <a:schemeClr val="accent1"/>
+            </a:fillRef>
+            <a:effectRef idx="0">
+              <a:schemeClr val="accent1"/>
+            </a:effectRef>
+            <a:fontRef idx="minor">
+              <a:schemeClr val="lt1"/>
+            </a:fontRef>
+          </p:style>
+          <p:txBody>
+            <a:bodyPr rtlCol="0" anchor="ctr"/>
+            <a:lstStyle/>
+            <a:p>
+              <a:pPr algn="ctr"/>
+              <a:endParaRPr lang="zh-TW" altLang="en-US"/>
+            </a:p>
+          </p:txBody>
+        </p:sp>
+        <p:sp>
+          <p:nvSpPr>
+            <p:cNvPr id="22" name="矩形 21"/>
+            <p:cNvSpPr/>
+            <p:nvPr/>
+          </p:nvSpPr>
+          <p:spPr>
+            <a:xfrm rot="3471389">
+              <a:off x="2471299" y="5359650"/>
+              <a:ext cx="1670546" cy="954491"/>
+            </a:xfrm>
+            <a:prstGeom prst="rect">
+              <a:avLst/>
+            </a:prstGeom>
+            <a:solidFill>
+              <a:srgbClr val="082908"/>
+            </a:solidFill>
+            <a:ln>
+              <a:noFill/>
+            </a:ln>
+          </p:spPr>
+          <p:style>
+            <a:lnRef idx="2">
+              <a:schemeClr val="accent1">
+                <a:shade val="50000"/>
+              </a:schemeClr>
+            </a:lnRef>
+            <a:fillRef idx="1">
+              <a:schemeClr val="accent1"/>
+            </a:fillRef>
+            <a:effectRef idx="0">
+              <a:schemeClr val="accent1"/>
+            </a:effectRef>
+            <a:fontRef idx="minor">
+              <a:schemeClr val="lt1"/>
+            </a:fontRef>
+          </p:style>
+          <p:txBody>
+            <a:bodyPr rtlCol="0" anchor="ctr"/>
+            <a:lstStyle/>
+            <a:p>
+              <a:pPr algn="ctr"/>
+              <a:endParaRPr lang="zh-TW" altLang="en-US"/>
+            </a:p>
+          </p:txBody>
+        </p:sp>
+        <p:sp>
+          <p:nvSpPr>
+            <p:cNvPr id="23" name="矩形 22"/>
+            <p:cNvSpPr/>
+            <p:nvPr/>
+          </p:nvSpPr>
+          <p:spPr>
+            <a:xfrm rot="3471389">
+              <a:off x="3332049" y="3788924"/>
+              <a:ext cx="686408" cy="954491"/>
+            </a:xfrm>
+            <a:prstGeom prst="rect">
+              <a:avLst/>
+            </a:prstGeom>
+            <a:solidFill>
+              <a:srgbClr val="082908"/>
+            </a:solidFill>
+            <a:ln>
+              <a:noFill/>
+            </a:ln>
+          </p:spPr>
+          <p:style>
+            <a:lnRef idx="2">
+              <a:schemeClr val="accent1">
+                <a:shade val="50000"/>
+              </a:schemeClr>
+            </a:lnRef>
+            <a:fillRef idx="1">
+              <a:schemeClr val="accent1"/>
+            </a:fillRef>
+            <a:effectRef idx="0">
+              <a:schemeClr val="accent1"/>
+            </a:effectRef>
+            <a:fontRef idx="minor">
+              <a:schemeClr val="lt1"/>
+            </a:fontRef>
+          </p:style>
+          <p:txBody>
+            <a:bodyPr rtlCol="0" anchor="ctr"/>
+            <a:lstStyle/>
+            <a:p>
+              <a:pPr algn="ctr"/>
+              <a:endParaRPr lang="zh-TW" altLang="en-US"/>
+            </a:p>
+          </p:txBody>
+        </p:sp>
+      </p:grpSp>
+      <p:grpSp>
+        <p:nvGrpSpPr>
+          <p:cNvPr id="13" name="群組 12"/>
+          <p:cNvGrpSpPr/>
+          <p:nvPr/>
+        </p:nvGrpSpPr>
+        <p:grpSpPr>
+          <a:xfrm>
+            <a:off x="1929214" y="2937306"/>
+            <a:ext cx="1899008" cy="2854205"/>
+            <a:chOff x="4577993" y="2403653"/>
+            <a:chExt cx="1899008" cy="2854205"/>
+          </a:xfrm>
+        </p:grpSpPr>
+        <p:sp>
+          <p:nvSpPr>
+            <p:cNvPr id="5" name="文字方塊 4"/>
+            <p:cNvSpPr txBox="1"/>
+            <p:nvPr/>
+          </p:nvSpPr>
+          <p:spPr>
+            <a:xfrm>
+              <a:off x="4577993" y="2403653"/>
+              <a:ext cx="1899008" cy="707886"/>
+            </a:xfrm>
+            <a:prstGeom prst="rect">
+              <a:avLst/>
+            </a:prstGeom>
+            <a:noFill/>
+          </p:spPr>
+          <p:txBody>
+            <a:bodyPr wrap="square" rtlCol="0">
+              <a:spAutoFit/>
+            </a:bodyPr>
+            <a:lstStyle/>
+            <a:p>
+              <a:r>
+                <a:rPr lang="en-US" altLang="zh-TW" sz="4000" dirty="0" smtClean="0">
                   <a:ln w="19050">
                     <a:solidFill>
                       <a:srgbClr val="041404"/>
@@ -3316,48 +3293,48 @@
                   </a:solidFill>
                   <a:latin typeface="FOT-Skip Std B" panose="02020700000000000000" pitchFamily="18" charset="-128"/>
                   <a:ea typeface="FOT-Skip Std B" panose="02020700000000000000" pitchFamily="18" charset="-128"/>
-                </a:endParaRPr>
-              </a:p>
-            </p:txBody>
-          </p:sp>
-          <p:sp>
-            <p:nvSpPr>
-              <p:cNvPr id="7" name="文字方塊 6"/>
-              <p:cNvSpPr txBox="1"/>
-              <p:nvPr/>
-            </p:nvSpPr>
-            <p:spPr>
-              <a:xfrm>
-                <a:off x="4577993" y="3119093"/>
-                <a:ext cx="1899008" cy="707886"/>
-              </a:xfrm>
-              <a:prstGeom prst="rect">
-                <a:avLst/>
-              </a:prstGeom>
-              <a:noFill/>
-            </p:spPr>
-            <p:txBody>
-              <a:bodyPr wrap="square" rtlCol="0">
-                <a:spAutoFit/>
-              </a:bodyPr>
-              <a:lstStyle/>
-              <a:p>
-                <a:r>
-                  <a:rPr lang="en-US" altLang="zh-TW" sz="4000" dirty="0" smtClean="0">
-                    <a:ln w="19050">
-                      <a:solidFill>
-                        <a:srgbClr val="041404"/>
-                      </a:solidFill>
-                    </a:ln>
-                    <a:solidFill>
-                      <a:srgbClr val="E6EEE8"/>
-                    </a:solidFill>
-                    <a:latin typeface="FOT-Skip Std B" panose="02020700000000000000" pitchFamily="18" charset="-128"/>
-                    <a:ea typeface="FOT-Skip Std B" panose="02020700000000000000" pitchFamily="18" charset="-128"/>
-                  </a:rPr>
-                  <a:t>replay</a:t>
-                </a:r>
-                <a:endParaRPr lang="zh-TW" altLang="en-US" sz="4000" dirty="0">
+                </a:rPr>
+                <a:t>option</a:t>
+              </a:r>
+              <a:endParaRPr lang="zh-TW" altLang="en-US" sz="4000" dirty="0">
+                <a:ln w="19050">
+                  <a:solidFill>
+                    <a:srgbClr val="041404"/>
+                  </a:solidFill>
+                </a:ln>
+                <a:solidFill>
+                  <a:srgbClr val="E6EEE8"/>
+                </a:solidFill>
+                <a:latin typeface="FOT-Skip Std B" panose="02020700000000000000" pitchFamily="18" charset="-128"/>
+                <a:ea typeface="FOT-Skip Std B" panose="02020700000000000000" pitchFamily="18" charset="-128"/>
+              </a:endParaRPr>
+            </a:p>
+          </p:txBody>
+        </p:sp>
+        <p:sp>
+          <p:nvSpPr>
+            <p:cNvPr id="7" name="文字方塊 6"/>
+            <p:cNvSpPr txBox="1"/>
+            <p:nvPr/>
+          </p:nvSpPr>
+          <p:spPr>
+            <a:xfrm>
+              <a:off x="4577993" y="3119093"/>
+              <a:ext cx="1899008" cy="707886"/>
+            </a:xfrm>
+            <a:prstGeom prst="rect">
+              <a:avLst/>
+            </a:prstGeom>
+            <a:noFill/>
+          </p:spPr>
+          <p:txBody>
+            <a:bodyPr wrap="square" rtlCol="0">
+              <a:spAutoFit/>
+            </a:bodyPr>
+            <a:lstStyle/>
+            <a:p>
+              <a:r>
+                <a:rPr lang="en-US" altLang="zh-TW" sz="4000" dirty="0" smtClean="0">
                   <a:ln w="19050">
                     <a:solidFill>
                       <a:srgbClr val="041404"/>
@@ -3368,48 +3345,48 @@
                   </a:solidFill>
                   <a:latin typeface="FOT-Skip Std B" panose="02020700000000000000" pitchFamily="18" charset="-128"/>
                   <a:ea typeface="FOT-Skip Std B" panose="02020700000000000000" pitchFamily="18" charset="-128"/>
-                </a:endParaRPr>
-              </a:p>
-            </p:txBody>
-          </p:sp>
-          <p:sp>
-            <p:nvSpPr>
-              <p:cNvPr id="8" name="文字方塊 7"/>
-              <p:cNvSpPr txBox="1"/>
-              <p:nvPr/>
-            </p:nvSpPr>
-            <p:spPr>
-              <a:xfrm>
-                <a:off x="4577993" y="3834533"/>
-                <a:ext cx="1899008" cy="707886"/>
-              </a:xfrm>
-              <a:prstGeom prst="rect">
-                <a:avLst/>
-              </a:prstGeom>
-              <a:noFill/>
-            </p:spPr>
-            <p:txBody>
-              <a:bodyPr wrap="square" rtlCol="0">
-                <a:spAutoFit/>
-              </a:bodyPr>
-              <a:lstStyle/>
-              <a:p>
-                <a:r>
-                  <a:rPr lang="en-US" altLang="zh-TW" sz="4000" dirty="0" smtClean="0">
-                    <a:ln w="19050">
-                      <a:solidFill>
-                        <a:srgbClr val="041404"/>
-                      </a:solidFill>
-                    </a:ln>
-                    <a:solidFill>
-                      <a:srgbClr val="E6EEE8"/>
-                    </a:solidFill>
-                    <a:latin typeface="FOT-Skip Std B" panose="02020700000000000000" pitchFamily="18" charset="-128"/>
-                    <a:ea typeface="FOT-Skip Std B" panose="02020700000000000000" pitchFamily="18" charset="-128"/>
-                  </a:rPr>
-                  <a:t>start</a:t>
-                </a:r>
-                <a:endParaRPr lang="zh-TW" altLang="en-US" sz="4000" dirty="0">
+                </a:rPr>
+                <a:t>replay</a:t>
+              </a:r>
+              <a:endParaRPr lang="zh-TW" altLang="en-US" sz="4000" dirty="0">
+                <a:ln w="19050">
+                  <a:solidFill>
+                    <a:srgbClr val="041404"/>
+                  </a:solidFill>
+                </a:ln>
+                <a:solidFill>
+                  <a:srgbClr val="E6EEE8"/>
+                </a:solidFill>
+                <a:latin typeface="FOT-Skip Std B" panose="02020700000000000000" pitchFamily="18" charset="-128"/>
+                <a:ea typeface="FOT-Skip Std B" panose="02020700000000000000" pitchFamily="18" charset="-128"/>
+              </a:endParaRPr>
+            </a:p>
+          </p:txBody>
+        </p:sp>
+        <p:sp>
+          <p:nvSpPr>
+            <p:cNvPr id="8" name="文字方塊 7"/>
+            <p:cNvSpPr txBox="1"/>
+            <p:nvPr/>
+          </p:nvSpPr>
+          <p:spPr>
+            <a:xfrm>
+              <a:off x="4577993" y="3834533"/>
+              <a:ext cx="1899008" cy="707886"/>
+            </a:xfrm>
+            <a:prstGeom prst="rect">
+              <a:avLst/>
+            </a:prstGeom>
+            <a:noFill/>
+          </p:spPr>
+          <p:txBody>
+            <a:bodyPr wrap="square" rtlCol="0">
+              <a:spAutoFit/>
+            </a:bodyPr>
+            <a:lstStyle/>
+            <a:p>
+              <a:r>
+                <a:rPr lang="en-US" altLang="zh-TW" sz="4000" dirty="0" smtClean="0">
                   <a:ln w="19050">
                     <a:solidFill>
                       <a:srgbClr val="041404"/>
@@ -3420,48 +3397,48 @@
                   </a:solidFill>
                   <a:latin typeface="FOT-Skip Std B" panose="02020700000000000000" pitchFamily="18" charset="-128"/>
                   <a:ea typeface="FOT-Skip Std B" panose="02020700000000000000" pitchFamily="18" charset="-128"/>
-                </a:endParaRPr>
-              </a:p>
-            </p:txBody>
-          </p:sp>
-          <p:sp>
-            <p:nvSpPr>
-              <p:cNvPr id="9" name="文字方塊 8"/>
-              <p:cNvSpPr txBox="1"/>
-              <p:nvPr/>
-            </p:nvSpPr>
-            <p:spPr>
-              <a:xfrm>
-                <a:off x="4577993" y="4549972"/>
-                <a:ext cx="1899008" cy="707886"/>
-              </a:xfrm>
-              <a:prstGeom prst="rect">
-                <a:avLst/>
-              </a:prstGeom>
-              <a:noFill/>
-            </p:spPr>
-            <p:txBody>
-              <a:bodyPr wrap="square" rtlCol="0">
-                <a:spAutoFit/>
-              </a:bodyPr>
-              <a:lstStyle/>
-              <a:p>
-                <a:r>
-                  <a:rPr lang="en-US" altLang="zh-TW" sz="4000" dirty="0" smtClean="0">
-                    <a:ln w="19050">
-                      <a:solidFill>
-                        <a:srgbClr val="041404"/>
-                      </a:solidFill>
-                    </a:ln>
-                    <a:solidFill>
-                      <a:srgbClr val="E6EEE8"/>
-                    </a:solidFill>
-                    <a:latin typeface="FOT-Skip Std B" panose="02020700000000000000" pitchFamily="18" charset="-128"/>
-                    <a:ea typeface="FOT-Skip Std B" panose="02020700000000000000" pitchFamily="18" charset="-128"/>
-                  </a:rPr>
-                  <a:t>quit</a:t>
-                </a:r>
-                <a:endParaRPr lang="zh-TW" altLang="en-US" sz="4000" dirty="0">
+                </a:rPr>
+                <a:t>start</a:t>
+              </a:r>
+              <a:endParaRPr lang="zh-TW" altLang="en-US" sz="4000" dirty="0">
+                <a:ln w="19050">
+                  <a:solidFill>
+                    <a:srgbClr val="041404"/>
+                  </a:solidFill>
+                </a:ln>
+                <a:solidFill>
+                  <a:srgbClr val="E6EEE8"/>
+                </a:solidFill>
+                <a:latin typeface="FOT-Skip Std B" panose="02020700000000000000" pitchFamily="18" charset="-128"/>
+                <a:ea typeface="FOT-Skip Std B" panose="02020700000000000000" pitchFamily="18" charset="-128"/>
+              </a:endParaRPr>
+            </a:p>
+          </p:txBody>
+        </p:sp>
+        <p:sp>
+          <p:nvSpPr>
+            <p:cNvPr id="9" name="文字方塊 8"/>
+            <p:cNvSpPr txBox="1"/>
+            <p:nvPr/>
+          </p:nvSpPr>
+          <p:spPr>
+            <a:xfrm>
+              <a:off x="4577993" y="4549972"/>
+              <a:ext cx="1899008" cy="707886"/>
+            </a:xfrm>
+            <a:prstGeom prst="rect">
+              <a:avLst/>
+            </a:prstGeom>
+            <a:noFill/>
+          </p:spPr>
+          <p:txBody>
+            <a:bodyPr wrap="square" rtlCol="0">
+              <a:spAutoFit/>
+            </a:bodyPr>
+            <a:lstStyle/>
+            <a:p>
+              <a:r>
+                <a:rPr lang="en-US" altLang="zh-TW" sz="4000" dirty="0" smtClean="0">
                   <a:ln w="19050">
                     <a:solidFill>
                       <a:srgbClr val="041404"/>
@@ -3472,11 +3449,24 @@
                   </a:solidFill>
                   <a:latin typeface="FOT-Skip Std B" panose="02020700000000000000" pitchFamily="18" charset="-128"/>
                   <a:ea typeface="FOT-Skip Std B" panose="02020700000000000000" pitchFamily="18" charset="-128"/>
-                </a:endParaRPr>
-              </a:p>
-            </p:txBody>
-          </p:sp>
-        </p:grpSp>
+                </a:rPr>
+                <a:t>quit</a:t>
+              </a:r>
+              <a:endParaRPr lang="zh-TW" altLang="en-US" sz="4000" dirty="0">
+                <a:ln w="19050">
+                  <a:solidFill>
+                    <a:srgbClr val="041404"/>
+                  </a:solidFill>
+                </a:ln>
+                <a:solidFill>
+                  <a:srgbClr val="E6EEE8"/>
+                </a:solidFill>
+                <a:latin typeface="FOT-Skip Std B" panose="02020700000000000000" pitchFamily="18" charset="-128"/>
+                <a:ea typeface="FOT-Skip Std B" panose="02020700000000000000" pitchFamily="18" charset="-128"/>
+              </a:endParaRPr>
+            </a:p>
+          </p:txBody>
+        </p:sp>
       </p:grpSp>
     </p:spTree>
     <p:extLst>

</xml_diff>

<commit_message>
Improve switch SFX construct setting scene
</commit_message>
<xml_diff>
--- a/Preview Images/drawboard.pptx
+++ b/Preview Images/drawboard.pptx
@@ -3558,7 +3558,7 @@
       </p:pic>
       <p:grpSp>
         <p:nvGrpSpPr>
-          <p:cNvPr id="128" name="群組 127"/>
+          <p:cNvPr id="131" name="群組 130"/>
           <p:cNvGrpSpPr/>
           <p:nvPr/>
         </p:nvGrpSpPr>
@@ -7065,31 +7065,46 @@
             </a:p>
           </p:txBody>
         </p:sp>
-      </p:grpSp>
-      <p:sp>
-        <p:nvSpPr>
-          <p:cNvPr id="129" name="文字方塊 128"/>
-          <p:cNvSpPr txBox="1"/>
-          <p:nvPr/>
-        </p:nvSpPr>
-        <p:spPr>
-          <a:xfrm>
-            <a:off x="7007269" y="2704741"/>
-            <a:ext cx="794203" cy="307777"/>
-          </a:xfrm>
-          <a:prstGeom prst="rect">
-            <a:avLst/>
-          </a:prstGeom>
-          <a:noFill/>
-        </p:spPr>
-        <p:txBody>
-          <a:bodyPr wrap="square" rtlCol="0">
-            <a:spAutoFit/>
-          </a:bodyPr>
-          <a:lstStyle/>
-          <a:p>
-            <a:r>
-              <a:rPr lang="en-US" altLang="zh-TW" sz="1400" dirty="0" smtClean="0">
+        <p:sp>
+          <p:nvSpPr>
+            <p:cNvPr id="129" name="文字方塊 128"/>
+            <p:cNvSpPr txBox="1"/>
+            <p:nvPr/>
+          </p:nvSpPr>
+          <p:spPr>
+            <a:xfrm>
+              <a:off x="7007269" y="2704741"/>
+              <a:ext cx="794203" cy="307777"/>
+            </a:xfrm>
+            <a:prstGeom prst="rect">
+              <a:avLst/>
+            </a:prstGeom>
+            <a:noFill/>
+          </p:spPr>
+          <p:txBody>
+            <a:bodyPr wrap="square" rtlCol="0">
+              <a:spAutoFit/>
+            </a:bodyPr>
+            <a:lstStyle/>
+            <a:p>
+              <a:r>
+                <a:rPr lang="en-US" altLang="zh-TW" sz="1400" dirty="0" smtClean="0">
+                  <a:ln>
+                    <a:solidFill>
+                      <a:schemeClr val="bg2">
+                        <a:lumMod val="75000"/>
+                      </a:schemeClr>
+                    </a:solidFill>
+                  </a:ln>
+                  <a:solidFill>
+                    <a:schemeClr val="bg1"/>
+                  </a:solidFill>
+                  <a:latin typeface="FOT-Skip Std B" panose="02020700000000000000" pitchFamily="18" charset="-128"/>
+                  <a:ea typeface="FOT-Skip Std B" panose="02020700000000000000" pitchFamily="18" charset="-128"/>
+                </a:rPr>
+                <a:t>MAX</a:t>
+              </a:r>
+              <a:endParaRPr lang="zh-TW" altLang="en-US" sz="1400" dirty="0">
                 <a:ln>
                   <a:solidFill>
                     <a:schemeClr val="bg2">
@@ -7102,50 +7117,50 @@
                 </a:solidFill>
                 <a:latin typeface="FOT-Skip Std B" panose="02020700000000000000" pitchFamily="18" charset="-128"/>
                 <a:ea typeface="FOT-Skip Std B" panose="02020700000000000000" pitchFamily="18" charset="-128"/>
-              </a:rPr>
-              <a:t>MAX</a:t>
-            </a:r>
-            <a:endParaRPr lang="zh-TW" altLang="en-US" sz="1400" dirty="0">
-              <a:ln>
-                <a:solidFill>
-                  <a:schemeClr val="bg2">
-                    <a:lumMod val="75000"/>
-                  </a:schemeClr>
-                </a:solidFill>
-              </a:ln>
-              <a:solidFill>
-                <a:schemeClr val="bg1"/>
-              </a:solidFill>
-              <a:latin typeface="FOT-Skip Std B" panose="02020700000000000000" pitchFamily="18" charset="-128"/>
-              <a:ea typeface="FOT-Skip Std B" panose="02020700000000000000" pitchFamily="18" charset="-128"/>
-            </a:endParaRPr>
-          </a:p>
-        </p:txBody>
-      </p:sp>
-      <p:sp>
-        <p:nvSpPr>
-          <p:cNvPr id="130" name="文字方塊 129"/>
-          <p:cNvSpPr txBox="1"/>
-          <p:nvPr/>
-        </p:nvSpPr>
-        <p:spPr>
-          <a:xfrm>
-            <a:off x="7007268" y="2992175"/>
-            <a:ext cx="794203" cy="307777"/>
-          </a:xfrm>
-          <a:prstGeom prst="rect">
-            <a:avLst/>
-          </a:prstGeom>
-          <a:noFill/>
-        </p:spPr>
-        <p:txBody>
-          <a:bodyPr wrap="square" rtlCol="0">
-            <a:spAutoFit/>
-          </a:bodyPr>
-          <a:lstStyle/>
-          <a:p>
-            <a:r>
-              <a:rPr lang="en-US" altLang="zh-TW" sz="1400" dirty="0" smtClean="0">
+              </a:endParaRPr>
+            </a:p>
+          </p:txBody>
+        </p:sp>
+        <p:sp>
+          <p:nvSpPr>
+            <p:cNvPr id="130" name="文字方塊 129"/>
+            <p:cNvSpPr txBox="1"/>
+            <p:nvPr/>
+          </p:nvSpPr>
+          <p:spPr>
+            <a:xfrm>
+              <a:off x="7007268" y="2992175"/>
+              <a:ext cx="794203" cy="307777"/>
+            </a:xfrm>
+            <a:prstGeom prst="rect">
+              <a:avLst/>
+            </a:prstGeom>
+            <a:noFill/>
+          </p:spPr>
+          <p:txBody>
+            <a:bodyPr wrap="square" rtlCol="0">
+              <a:spAutoFit/>
+            </a:bodyPr>
+            <a:lstStyle/>
+            <a:p>
+              <a:r>
+                <a:rPr lang="en-US" altLang="zh-TW" sz="1400" dirty="0" smtClean="0">
+                  <a:ln>
+                    <a:solidFill>
+                      <a:schemeClr val="bg2">
+                        <a:lumMod val="75000"/>
+                      </a:schemeClr>
+                    </a:solidFill>
+                  </a:ln>
+                  <a:solidFill>
+                    <a:schemeClr val="bg1"/>
+                  </a:solidFill>
+                  <a:latin typeface="FOT-Skip Std B" panose="02020700000000000000" pitchFamily="18" charset="-128"/>
+                  <a:ea typeface="FOT-Skip Std B" panose="02020700000000000000" pitchFamily="18" charset="-128"/>
+                </a:rPr>
+                <a:t>300</a:t>
+              </a:r>
+              <a:endParaRPr lang="zh-TW" altLang="en-US" sz="1400" dirty="0">
                 <a:ln>
                   <a:solidFill>
                     <a:schemeClr val="bg2">
@@ -7158,26 +7173,11 @@
                 </a:solidFill>
                 <a:latin typeface="FOT-Skip Std B" panose="02020700000000000000" pitchFamily="18" charset="-128"/>
                 <a:ea typeface="FOT-Skip Std B" panose="02020700000000000000" pitchFamily="18" charset="-128"/>
-              </a:rPr>
-              <a:t>300</a:t>
-            </a:r>
-            <a:endParaRPr lang="zh-TW" altLang="en-US" sz="1400" dirty="0">
-              <a:ln>
-                <a:solidFill>
-                  <a:schemeClr val="bg2">
-                    <a:lumMod val="75000"/>
-                  </a:schemeClr>
-                </a:solidFill>
-              </a:ln>
-              <a:solidFill>
-                <a:schemeClr val="bg1"/>
-              </a:solidFill>
-              <a:latin typeface="FOT-Skip Std B" panose="02020700000000000000" pitchFamily="18" charset="-128"/>
-              <a:ea typeface="FOT-Skip Std B" panose="02020700000000000000" pitchFamily="18" charset="-128"/>
-            </a:endParaRPr>
-          </a:p>
-        </p:txBody>
-      </p:sp>
+              </a:endParaRPr>
+            </a:p>
+          </p:txBody>
+        </p:sp>
+      </p:grpSp>
     </p:spTree>
     <p:extLst>
       <p:ext uri="{BB962C8B-B14F-4D97-AF65-F5344CB8AC3E}">

</xml_diff>

<commit_message>
try multilang not success due to the unicode system
</commit_message>
<xml_diff>
--- a/Preview Images/drawboard.pptx
+++ b/Preview Images/drawboard.pptx
@@ -7,6 +7,7 @@
   <p:sldIdLst>
     <p:sldId id="256" r:id="rId2"/>
     <p:sldId id="257" r:id="rId3"/>
+    <p:sldId id="258" r:id="rId4"/>
   </p:sldIdLst>
   <p:sldSz cx="12192000" cy="6858000"/>
   <p:notesSz cx="6858000" cy="9144000"/>
@@ -244,7 +245,7 @@
           <a:p>
             <a:fld id="{628A46F5-8AEF-4E68-9DE5-F9F420B16F36}" type="datetimeFigureOut">
               <a:rPr lang="zh-TW" altLang="en-US" smtClean="0"/>
-              <a:t>2019/5/31</a:t>
+              <a:t>2019/6/3</a:t>
             </a:fld>
             <a:endParaRPr lang="zh-TW" altLang="en-US"/>
           </a:p>
@@ -414,7 +415,7 @@
           <a:p>
             <a:fld id="{628A46F5-8AEF-4E68-9DE5-F9F420B16F36}" type="datetimeFigureOut">
               <a:rPr lang="zh-TW" altLang="en-US" smtClean="0"/>
-              <a:t>2019/5/31</a:t>
+              <a:t>2019/6/3</a:t>
             </a:fld>
             <a:endParaRPr lang="zh-TW" altLang="en-US"/>
           </a:p>
@@ -594,7 +595,7 @@
           <a:p>
             <a:fld id="{628A46F5-8AEF-4E68-9DE5-F9F420B16F36}" type="datetimeFigureOut">
               <a:rPr lang="zh-TW" altLang="en-US" smtClean="0"/>
-              <a:t>2019/5/31</a:t>
+              <a:t>2019/6/3</a:t>
             </a:fld>
             <a:endParaRPr lang="zh-TW" altLang="en-US"/>
           </a:p>
@@ -764,7 +765,7 @@
           <a:p>
             <a:fld id="{628A46F5-8AEF-4E68-9DE5-F9F420B16F36}" type="datetimeFigureOut">
               <a:rPr lang="zh-TW" altLang="en-US" smtClean="0"/>
-              <a:t>2019/5/31</a:t>
+              <a:t>2019/6/3</a:t>
             </a:fld>
             <a:endParaRPr lang="zh-TW" altLang="en-US"/>
           </a:p>
@@ -1010,7 +1011,7 @@
           <a:p>
             <a:fld id="{628A46F5-8AEF-4E68-9DE5-F9F420B16F36}" type="datetimeFigureOut">
               <a:rPr lang="zh-TW" altLang="en-US" smtClean="0"/>
-              <a:t>2019/5/31</a:t>
+              <a:t>2019/6/3</a:t>
             </a:fld>
             <a:endParaRPr lang="zh-TW" altLang="en-US"/>
           </a:p>
@@ -1242,7 +1243,7 @@
           <a:p>
             <a:fld id="{628A46F5-8AEF-4E68-9DE5-F9F420B16F36}" type="datetimeFigureOut">
               <a:rPr lang="zh-TW" altLang="en-US" smtClean="0"/>
-              <a:t>2019/5/31</a:t>
+              <a:t>2019/6/3</a:t>
             </a:fld>
             <a:endParaRPr lang="zh-TW" altLang="en-US"/>
           </a:p>
@@ -1609,7 +1610,7 @@
           <a:p>
             <a:fld id="{628A46F5-8AEF-4E68-9DE5-F9F420B16F36}" type="datetimeFigureOut">
               <a:rPr lang="zh-TW" altLang="en-US" smtClean="0"/>
-              <a:t>2019/5/31</a:t>
+              <a:t>2019/6/3</a:t>
             </a:fld>
             <a:endParaRPr lang="zh-TW" altLang="en-US"/>
           </a:p>
@@ -1727,7 +1728,7 @@
           <a:p>
             <a:fld id="{628A46F5-8AEF-4E68-9DE5-F9F420B16F36}" type="datetimeFigureOut">
               <a:rPr lang="zh-TW" altLang="en-US" smtClean="0"/>
-              <a:t>2019/5/31</a:t>
+              <a:t>2019/6/3</a:t>
             </a:fld>
             <a:endParaRPr lang="zh-TW" altLang="en-US"/>
           </a:p>
@@ -1822,7 +1823,7 @@
           <a:p>
             <a:fld id="{628A46F5-8AEF-4E68-9DE5-F9F420B16F36}" type="datetimeFigureOut">
               <a:rPr lang="zh-TW" altLang="en-US" smtClean="0"/>
-              <a:t>2019/5/31</a:t>
+              <a:t>2019/6/3</a:t>
             </a:fld>
             <a:endParaRPr lang="zh-TW" altLang="en-US"/>
           </a:p>
@@ -2099,7 +2100,7 @@
           <a:p>
             <a:fld id="{628A46F5-8AEF-4E68-9DE5-F9F420B16F36}" type="datetimeFigureOut">
               <a:rPr lang="zh-TW" altLang="en-US" smtClean="0"/>
-              <a:t>2019/5/31</a:t>
+              <a:t>2019/6/3</a:t>
             </a:fld>
             <a:endParaRPr lang="zh-TW" altLang="en-US"/>
           </a:p>
@@ -2352,7 +2353,7 @@
           <a:p>
             <a:fld id="{628A46F5-8AEF-4E68-9DE5-F9F420B16F36}" type="datetimeFigureOut">
               <a:rPr lang="zh-TW" altLang="en-US" smtClean="0"/>
-              <a:t>2019/5/31</a:t>
+              <a:t>2019/6/3</a:t>
             </a:fld>
             <a:endParaRPr lang="zh-TW" altLang="en-US"/>
           </a:p>
@@ -2565,7 +2566,7 @@
           <a:p>
             <a:fld id="{628A46F5-8AEF-4E68-9DE5-F9F420B16F36}" type="datetimeFigureOut">
               <a:rPr lang="zh-TW" altLang="en-US" smtClean="0"/>
-              <a:t>2019/5/31</a:t>
+              <a:t>2019/6/3</a:t>
             </a:fld>
             <a:endParaRPr lang="zh-TW" altLang="en-US"/>
           </a:p>
@@ -2972,21 +2973,21 @@
       </p:grpSpPr>
       <p:grpSp>
         <p:nvGrpSpPr>
-          <p:cNvPr id="24" name="群組 23"/>
+          <p:cNvPr id="44" name="群組 43"/>
           <p:cNvGrpSpPr/>
           <p:nvPr/>
         </p:nvGrpSpPr>
         <p:grpSpPr>
           <a:xfrm>
-            <a:off x="868679" y="0"/>
-            <a:ext cx="9144001" cy="6858000"/>
-            <a:chOff x="868679" y="0"/>
-            <a:chExt cx="9144001" cy="6858000"/>
+            <a:off x="560507" y="667657"/>
+            <a:ext cx="10058400" cy="5729765"/>
+            <a:chOff x="560507" y="667657"/>
+            <a:chExt cx="10058400" cy="5729765"/>
           </a:xfrm>
         </p:grpSpPr>
         <p:pic>
           <p:nvPicPr>
-            <p:cNvPr id="4" name="圖片 3"/>
+            <p:cNvPr id="37" name="圖片 36"/>
             <p:cNvPicPr>
               <a:picLocks noChangeAspect="1"/>
             </p:cNvPicPr>
@@ -3006,467 +3007,199 @@
           </p:blipFill>
           <p:spPr>
             <a:xfrm>
-              <a:off x="868679" y="0"/>
-              <a:ext cx="9144001" cy="6858000"/>
+              <a:off x="560507" y="667657"/>
+              <a:ext cx="10058400" cy="5729765"/>
             </a:xfrm>
             <a:prstGeom prst="rect">
               <a:avLst/>
             </a:prstGeom>
           </p:spPr>
         </p:pic>
-        <p:sp>
-          <p:nvSpPr>
-            <p:cNvPr id="17" name="矩形 16"/>
-            <p:cNvSpPr/>
+        <p:grpSp>
+          <p:nvGrpSpPr>
+            <p:cNvPr id="43" name="群組 42"/>
+            <p:cNvGrpSpPr/>
             <p:nvPr/>
-          </p:nvSpPr>
-          <p:spPr>
-            <a:xfrm rot="2104840">
-              <a:off x="1053427" y="4175782"/>
-              <a:ext cx="1292045" cy="975765"/>
+          </p:nvGrpSpPr>
+          <p:grpSpPr>
+            <a:xfrm>
+              <a:off x="3268184" y="3147818"/>
+              <a:ext cx="4643045" cy="769441"/>
+              <a:chOff x="2972238" y="3036358"/>
+              <a:chExt cx="4643045" cy="769441"/>
             </a:xfrm>
-            <a:prstGeom prst="rect">
-              <a:avLst/>
-            </a:prstGeom>
-            <a:solidFill>
-              <a:srgbClr val="082908"/>
-            </a:solidFill>
-            <a:ln>
+          </p:grpSpPr>
+          <p:sp>
+            <p:nvSpPr>
+              <p:cNvPr id="40" name="向右箭號 39"/>
+              <p:cNvSpPr/>
+              <p:nvPr/>
+            </p:nvSpPr>
+            <p:spPr>
+              <a:xfrm>
+                <a:off x="6734629" y="3113494"/>
+                <a:ext cx="880654" cy="615168"/>
+              </a:xfrm>
+              <a:prstGeom prst="rightArrow">
+                <a:avLst>
+                  <a:gd name="adj1" fmla="val 51587"/>
+                  <a:gd name="adj2" fmla="val 66218"/>
+                </a:avLst>
+              </a:prstGeom>
+              <a:solidFill>
+                <a:schemeClr val="tx2">
+                  <a:lumMod val="75000"/>
+                </a:schemeClr>
+              </a:solidFill>
+              <a:scene3d>
+                <a:camera prst="orthographicFront"/>
+                <a:lightRig rig="threePt" dir="t"/>
+              </a:scene3d>
+              <a:sp3d>
+                <a:bevelT prst="angle"/>
+              </a:sp3d>
+            </p:spPr>
+            <p:style>
+              <a:lnRef idx="2">
+                <a:schemeClr val="dk1">
+                  <a:shade val="50000"/>
+                </a:schemeClr>
+              </a:lnRef>
+              <a:fillRef idx="1">
+                <a:schemeClr val="dk1"/>
+              </a:fillRef>
+              <a:effectRef idx="0">
+                <a:schemeClr val="dk1"/>
+              </a:effectRef>
+              <a:fontRef idx="minor">
+                <a:schemeClr val="lt1"/>
+              </a:fontRef>
+            </p:style>
+            <p:txBody>
+              <a:bodyPr rtlCol="0" anchor="ctr"/>
+              <a:lstStyle/>
+              <a:p>
+                <a:pPr algn="ctr"/>
+                <a:endParaRPr lang="zh-TW" altLang="en-US"/>
+              </a:p>
+            </p:txBody>
+          </p:sp>
+          <p:sp>
+            <p:nvSpPr>
+              <p:cNvPr id="41" name="向右箭號 40"/>
+              <p:cNvSpPr/>
+              <p:nvPr/>
+            </p:nvSpPr>
+            <p:spPr>
+              <a:xfrm flipH="1">
+                <a:off x="2972238" y="3113494"/>
+                <a:ext cx="880654" cy="615168"/>
+              </a:xfrm>
+              <a:prstGeom prst="rightArrow">
+                <a:avLst>
+                  <a:gd name="adj1" fmla="val 51587"/>
+                  <a:gd name="adj2" fmla="val 66218"/>
+                </a:avLst>
+              </a:prstGeom>
+              <a:solidFill>
+                <a:schemeClr val="tx2">
+                  <a:lumMod val="75000"/>
+                </a:schemeClr>
+              </a:solidFill>
+              <a:scene3d>
+                <a:camera prst="orthographicFront"/>
+                <a:lightRig rig="threePt" dir="t"/>
+              </a:scene3d>
+              <a:sp3d>
+                <a:bevelT prst="angle"/>
+              </a:sp3d>
+            </p:spPr>
+            <p:style>
+              <a:lnRef idx="2">
+                <a:schemeClr val="dk1">
+                  <a:shade val="50000"/>
+                </a:schemeClr>
+              </a:lnRef>
+              <a:fillRef idx="1">
+                <a:schemeClr val="dk1"/>
+              </a:fillRef>
+              <a:effectRef idx="0">
+                <a:schemeClr val="dk1"/>
+              </a:effectRef>
+              <a:fontRef idx="minor">
+                <a:schemeClr val="lt1"/>
+              </a:fontRef>
+            </p:style>
+            <p:txBody>
+              <a:bodyPr rtlCol="0" anchor="ctr"/>
+              <a:lstStyle/>
+              <a:p>
+                <a:pPr algn="ctr"/>
+                <a:endParaRPr lang="zh-TW" altLang="en-US"/>
+              </a:p>
+            </p:txBody>
+          </p:sp>
+          <p:sp>
+            <p:nvSpPr>
+              <p:cNvPr id="42" name="文字方塊 41"/>
+              <p:cNvSpPr txBox="1"/>
+              <p:nvPr/>
+            </p:nvSpPr>
+            <p:spPr>
+              <a:xfrm>
+                <a:off x="3852892" y="3036358"/>
+                <a:ext cx="2881737" cy="769441"/>
+              </a:xfrm>
+              <a:prstGeom prst="rect">
+                <a:avLst/>
+              </a:prstGeom>
               <a:noFill/>
-            </a:ln>
-          </p:spPr>
-          <p:style>
-            <a:lnRef idx="2">
-              <a:schemeClr val="accent1">
-                <a:shade val="50000"/>
-              </a:schemeClr>
-            </a:lnRef>
-            <a:fillRef idx="1">
-              <a:schemeClr val="accent1"/>
-            </a:fillRef>
-            <a:effectRef idx="0">
-              <a:schemeClr val="accent1"/>
-            </a:effectRef>
-            <a:fontRef idx="minor">
-              <a:schemeClr val="lt1"/>
-            </a:fontRef>
-          </p:style>
-          <p:txBody>
-            <a:bodyPr rtlCol="0" anchor="ctr"/>
-            <a:lstStyle/>
-            <a:p>
-              <a:pPr algn="ctr"/>
-              <a:endParaRPr lang="zh-TW" altLang="en-US"/>
-            </a:p>
-          </p:txBody>
-        </p:sp>
-        <p:sp>
-          <p:nvSpPr>
-            <p:cNvPr id="18" name="矩形 17"/>
-            <p:cNvSpPr/>
-            <p:nvPr/>
-          </p:nvSpPr>
-          <p:spPr>
-            <a:xfrm>
-              <a:off x="2087880" y="6239580"/>
-              <a:ext cx="2241503" cy="615201"/>
-            </a:xfrm>
-            <a:prstGeom prst="rect">
-              <a:avLst/>
-            </a:prstGeom>
-            <a:solidFill>
-              <a:srgbClr val="082908"/>
-            </a:solidFill>
-            <a:ln>
-              <a:noFill/>
-            </a:ln>
-          </p:spPr>
-          <p:style>
-            <a:lnRef idx="2">
-              <a:schemeClr val="accent1">
-                <a:shade val="50000"/>
-              </a:schemeClr>
-            </a:lnRef>
-            <a:fillRef idx="1">
-              <a:schemeClr val="accent1"/>
-            </a:fillRef>
-            <a:effectRef idx="0">
-              <a:schemeClr val="accent1"/>
-            </a:effectRef>
-            <a:fontRef idx="minor">
-              <a:schemeClr val="lt1"/>
-            </a:fontRef>
-          </p:style>
-          <p:txBody>
-            <a:bodyPr rtlCol="0" anchor="ctr"/>
-            <a:lstStyle/>
-            <a:p>
-              <a:pPr algn="ctr"/>
-              <a:endParaRPr lang="zh-TW" altLang="en-US"/>
-            </a:p>
-          </p:txBody>
-        </p:sp>
-        <p:sp>
-          <p:nvSpPr>
-            <p:cNvPr id="21" name="矩形 20"/>
-            <p:cNvSpPr/>
-            <p:nvPr/>
-          </p:nvSpPr>
-          <p:spPr>
-            <a:xfrm rot="5400000">
-              <a:off x="1809076" y="5276026"/>
-              <a:ext cx="1292045" cy="975765"/>
-            </a:xfrm>
-            <a:prstGeom prst="rect">
-              <a:avLst/>
-            </a:prstGeom>
-            <a:solidFill>
-              <a:srgbClr val="082908"/>
-            </a:solidFill>
-            <a:ln>
-              <a:noFill/>
-            </a:ln>
-          </p:spPr>
-          <p:style>
-            <a:lnRef idx="2">
-              <a:schemeClr val="accent1">
-                <a:shade val="50000"/>
-              </a:schemeClr>
-            </a:lnRef>
-            <a:fillRef idx="1">
-              <a:schemeClr val="accent1"/>
-            </a:fillRef>
-            <a:effectRef idx="0">
-              <a:schemeClr val="accent1"/>
-            </a:effectRef>
-            <a:fontRef idx="minor">
-              <a:schemeClr val="lt1"/>
-            </a:fontRef>
-          </p:style>
-          <p:txBody>
-            <a:bodyPr rtlCol="0" anchor="ctr"/>
-            <a:lstStyle/>
-            <a:p>
-              <a:pPr algn="ctr"/>
-              <a:endParaRPr lang="zh-TW" altLang="en-US"/>
-            </a:p>
-          </p:txBody>
-        </p:sp>
-        <p:sp>
-          <p:nvSpPr>
-            <p:cNvPr id="22" name="矩形 21"/>
-            <p:cNvSpPr/>
-            <p:nvPr/>
-          </p:nvSpPr>
-          <p:spPr>
-            <a:xfrm rot="3471389">
-              <a:off x="2471299" y="5359650"/>
-              <a:ext cx="1670546" cy="954491"/>
-            </a:xfrm>
-            <a:prstGeom prst="rect">
-              <a:avLst/>
-            </a:prstGeom>
-            <a:solidFill>
-              <a:srgbClr val="082908"/>
-            </a:solidFill>
-            <a:ln>
-              <a:noFill/>
-            </a:ln>
-          </p:spPr>
-          <p:style>
-            <a:lnRef idx="2">
-              <a:schemeClr val="accent1">
-                <a:shade val="50000"/>
-              </a:schemeClr>
-            </a:lnRef>
-            <a:fillRef idx="1">
-              <a:schemeClr val="accent1"/>
-            </a:fillRef>
-            <a:effectRef idx="0">
-              <a:schemeClr val="accent1"/>
-            </a:effectRef>
-            <a:fontRef idx="minor">
-              <a:schemeClr val="lt1"/>
-            </a:fontRef>
-          </p:style>
-          <p:txBody>
-            <a:bodyPr rtlCol="0" anchor="ctr"/>
-            <a:lstStyle/>
-            <a:p>
-              <a:pPr algn="ctr"/>
-              <a:endParaRPr lang="zh-TW" altLang="en-US"/>
-            </a:p>
-          </p:txBody>
-        </p:sp>
-        <p:sp>
-          <p:nvSpPr>
-            <p:cNvPr id="23" name="矩形 22"/>
-            <p:cNvSpPr/>
-            <p:nvPr/>
-          </p:nvSpPr>
-          <p:spPr>
-            <a:xfrm rot="3471389">
-              <a:off x="3332049" y="3788924"/>
-              <a:ext cx="686408" cy="954491"/>
-            </a:xfrm>
-            <a:prstGeom prst="rect">
-              <a:avLst/>
-            </a:prstGeom>
-            <a:solidFill>
-              <a:srgbClr val="082908"/>
-            </a:solidFill>
-            <a:ln>
-              <a:noFill/>
-            </a:ln>
-          </p:spPr>
-          <p:style>
-            <a:lnRef idx="2">
-              <a:schemeClr val="accent1">
-                <a:shade val="50000"/>
-              </a:schemeClr>
-            </a:lnRef>
-            <a:fillRef idx="1">
-              <a:schemeClr val="accent1"/>
-            </a:fillRef>
-            <a:effectRef idx="0">
-              <a:schemeClr val="accent1"/>
-            </a:effectRef>
-            <a:fontRef idx="minor">
-              <a:schemeClr val="lt1"/>
-            </a:fontRef>
-          </p:style>
-          <p:txBody>
-            <a:bodyPr rtlCol="0" anchor="ctr"/>
-            <a:lstStyle/>
-            <a:p>
-              <a:pPr algn="ctr"/>
-              <a:endParaRPr lang="zh-TW" altLang="en-US"/>
-            </a:p>
-          </p:txBody>
-        </p:sp>
-      </p:grpSp>
-      <p:grpSp>
-        <p:nvGrpSpPr>
-          <p:cNvPr id="13" name="群組 12"/>
-          <p:cNvGrpSpPr/>
-          <p:nvPr/>
-        </p:nvGrpSpPr>
-        <p:grpSpPr>
-          <a:xfrm>
-            <a:off x="1929214" y="2937306"/>
-            <a:ext cx="1899008" cy="2854205"/>
-            <a:chOff x="4577993" y="2403653"/>
-            <a:chExt cx="1899008" cy="2854205"/>
-          </a:xfrm>
-        </p:grpSpPr>
-        <p:sp>
-          <p:nvSpPr>
-            <p:cNvPr id="5" name="文字方塊 4"/>
-            <p:cNvSpPr txBox="1"/>
-            <p:nvPr/>
-          </p:nvSpPr>
-          <p:spPr>
-            <a:xfrm>
-              <a:off x="4577993" y="2403653"/>
-              <a:ext cx="1899008" cy="707886"/>
-            </a:xfrm>
-            <a:prstGeom prst="rect">
-              <a:avLst/>
-            </a:prstGeom>
-            <a:noFill/>
-          </p:spPr>
-          <p:txBody>
-            <a:bodyPr wrap="square" rtlCol="0">
-              <a:spAutoFit/>
-            </a:bodyPr>
-            <a:lstStyle/>
-            <a:p>
-              <a:r>
-                <a:rPr lang="en-US" altLang="zh-TW" sz="4000" dirty="0" smtClean="0">
-                  <a:ln w="19050">
+            </p:spPr>
+            <p:txBody>
+              <a:bodyPr wrap="square" rtlCol="0" anchor="ctr">
+                <a:spAutoFit/>
+              </a:bodyPr>
+              <a:lstStyle/>
+              <a:p>
+                <a:pPr algn="ctr"/>
+                <a:r>
+                  <a:rPr lang="zh-TW" altLang="en-US" sz="4400" dirty="0" smtClean="0">
+                    <a:ln>
+                      <a:solidFill>
+                        <a:schemeClr val="bg1">
+                          <a:lumMod val="50000"/>
+                        </a:schemeClr>
+                      </a:solidFill>
+                    </a:ln>
                     <a:solidFill>
-                      <a:srgbClr val="041404"/>
+                      <a:schemeClr val="bg1"/>
                     </a:solidFill>
-                  </a:ln>
-                  <a:solidFill>
-                    <a:srgbClr val="E6EEE8"/>
-                  </a:solidFill>
-                  <a:latin typeface="FOT-Skip Std B" panose="02020700000000000000" pitchFamily="18" charset="-128"/>
-                  <a:ea typeface="FOT-Skip Std B" panose="02020700000000000000" pitchFamily="18" charset="-128"/>
-                </a:rPr>
-                <a:t>option</a:t>
-              </a:r>
-              <a:endParaRPr lang="zh-TW" altLang="en-US" sz="4000" dirty="0">
-                <a:ln w="19050">
-                  <a:solidFill>
-                    <a:srgbClr val="041404"/>
-                  </a:solidFill>
-                </a:ln>
-                <a:solidFill>
-                  <a:srgbClr val="E6EEE8"/>
-                </a:solidFill>
-                <a:latin typeface="FOT-Skip Std B" panose="02020700000000000000" pitchFamily="18" charset="-128"/>
-                <a:ea typeface="FOT-Skip Std B" panose="02020700000000000000" pitchFamily="18" charset="-128"/>
-              </a:endParaRPr>
-            </a:p>
-          </p:txBody>
-        </p:sp>
-        <p:sp>
-          <p:nvSpPr>
-            <p:cNvPr id="7" name="文字方塊 6"/>
-            <p:cNvSpPr txBox="1"/>
-            <p:nvPr/>
-          </p:nvSpPr>
-          <p:spPr>
-            <a:xfrm>
-              <a:off x="4577993" y="3119093"/>
-              <a:ext cx="1899008" cy="707886"/>
-            </a:xfrm>
-            <a:prstGeom prst="rect">
-              <a:avLst/>
-            </a:prstGeom>
-            <a:noFill/>
-          </p:spPr>
-          <p:txBody>
-            <a:bodyPr wrap="square" rtlCol="0">
-              <a:spAutoFit/>
-            </a:bodyPr>
-            <a:lstStyle/>
-            <a:p>
-              <a:r>
-                <a:rPr lang="en-US" altLang="zh-TW" sz="4000" dirty="0" smtClean="0">
-                  <a:ln w="19050">
+                    <a:latin typeface="FOT-Skip Std B" panose="02020700000000000000" pitchFamily="18" charset="-128"/>
+                    <a:ea typeface="FOT-Skip Std B" panose="02020700000000000000" pitchFamily="18" charset="-128"/>
+                  </a:rPr>
+                  <a:t>中</a:t>
+                </a:r>
+                <a:r>
+                  <a:rPr lang="zh-TW" altLang="en-US" sz="4400" dirty="0">
+                    <a:ln>
+                      <a:solidFill>
+                        <a:schemeClr val="bg1">
+                          <a:lumMod val="50000"/>
+                        </a:schemeClr>
+                      </a:solidFill>
+                    </a:ln>
                     <a:solidFill>
-                      <a:srgbClr val="041404"/>
+                      <a:schemeClr val="bg1"/>
                     </a:solidFill>
-                  </a:ln>
-                  <a:solidFill>
-                    <a:srgbClr val="E6EEE8"/>
-                  </a:solidFill>
-                  <a:latin typeface="FOT-Skip Std B" panose="02020700000000000000" pitchFamily="18" charset="-128"/>
-                  <a:ea typeface="FOT-Skip Std B" panose="02020700000000000000" pitchFamily="18" charset="-128"/>
-                </a:rPr>
-                <a:t>replay</a:t>
-              </a:r>
-              <a:endParaRPr lang="zh-TW" altLang="en-US" sz="4000" dirty="0">
-                <a:ln w="19050">
-                  <a:solidFill>
-                    <a:srgbClr val="041404"/>
-                  </a:solidFill>
-                </a:ln>
-                <a:solidFill>
-                  <a:srgbClr val="E6EEE8"/>
-                </a:solidFill>
-                <a:latin typeface="FOT-Skip Std B" panose="02020700000000000000" pitchFamily="18" charset="-128"/>
-                <a:ea typeface="FOT-Skip Std B" panose="02020700000000000000" pitchFamily="18" charset="-128"/>
-              </a:endParaRPr>
-            </a:p>
-          </p:txBody>
-        </p:sp>
-        <p:sp>
-          <p:nvSpPr>
-            <p:cNvPr id="8" name="文字方塊 7"/>
-            <p:cNvSpPr txBox="1"/>
-            <p:nvPr/>
-          </p:nvSpPr>
-          <p:spPr>
-            <a:xfrm>
-              <a:off x="4577993" y="3834533"/>
-              <a:ext cx="1899008" cy="707886"/>
-            </a:xfrm>
-            <a:prstGeom prst="rect">
-              <a:avLst/>
-            </a:prstGeom>
-            <a:noFill/>
-          </p:spPr>
-          <p:txBody>
-            <a:bodyPr wrap="square" rtlCol="0">
-              <a:spAutoFit/>
-            </a:bodyPr>
-            <a:lstStyle/>
-            <a:p>
-              <a:r>
-                <a:rPr lang="en-US" altLang="zh-TW" sz="4000" dirty="0" smtClean="0">
-                  <a:ln w="19050">
-                    <a:solidFill>
-                      <a:srgbClr val="041404"/>
-                    </a:solidFill>
-                  </a:ln>
-                  <a:solidFill>
-                    <a:srgbClr val="E6EEE8"/>
-                  </a:solidFill>
-                  <a:latin typeface="FOT-Skip Std B" panose="02020700000000000000" pitchFamily="18" charset="-128"/>
-                  <a:ea typeface="FOT-Skip Std B" panose="02020700000000000000" pitchFamily="18" charset="-128"/>
-                </a:rPr>
-                <a:t>start</a:t>
-              </a:r>
-              <a:endParaRPr lang="zh-TW" altLang="en-US" sz="4000" dirty="0">
-                <a:ln w="19050">
-                  <a:solidFill>
-                    <a:srgbClr val="041404"/>
-                  </a:solidFill>
-                </a:ln>
-                <a:solidFill>
-                  <a:srgbClr val="E6EEE8"/>
-                </a:solidFill>
-                <a:latin typeface="FOT-Skip Std B" panose="02020700000000000000" pitchFamily="18" charset="-128"/>
-                <a:ea typeface="FOT-Skip Std B" panose="02020700000000000000" pitchFamily="18" charset="-128"/>
-              </a:endParaRPr>
-            </a:p>
-          </p:txBody>
-        </p:sp>
-        <p:sp>
-          <p:nvSpPr>
-            <p:cNvPr id="9" name="文字方塊 8"/>
-            <p:cNvSpPr txBox="1"/>
-            <p:nvPr/>
-          </p:nvSpPr>
-          <p:spPr>
-            <a:xfrm>
-              <a:off x="4577993" y="4549972"/>
-              <a:ext cx="1899008" cy="707886"/>
-            </a:xfrm>
-            <a:prstGeom prst="rect">
-              <a:avLst/>
-            </a:prstGeom>
-            <a:noFill/>
-          </p:spPr>
-          <p:txBody>
-            <a:bodyPr wrap="square" rtlCol="0">
-              <a:spAutoFit/>
-            </a:bodyPr>
-            <a:lstStyle/>
-            <a:p>
-              <a:r>
-                <a:rPr lang="en-US" altLang="zh-TW" sz="4000" dirty="0" smtClean="0">
-                  <a:ln w="19050">
-                    <a:solidFill>
-                      <a:srgbClr val="041404"/>
-                    </a:solidFill>
-                  </a:ln>
-                  <a:solidFill>
-                    <a:srgbClr val="E6EEE8"/>
-                  </a:solidFill>
-                  <a:latin typeface="FOT-Skip Std B" panose="02020700000000000000" pitchFamily="18" charset="-128"/>
-                  <a:ea typeface="FOT-Skip Std B" panose="02020700000000000000" pitchFamily="18" charset="-128"/>
-                </a:rPr>
-                <a:t>quit</a:t>
-              </a:r>
-              <a:endParaRPr lang="zh-TW" altLang="en-US" sz="4000" dirty="0">
-                <a:ln w="19050">
-                  <a:solidFill>
-                    <a:srgbClr val="041404"/>
-                  </a:solidFill>
-                </a:ln>
-                <a:solidFill>
-                  <a:srgbClr val="E6EEE8"/>
-                </a:solidFill>
-                <a:latin typeface="FOT-Skip Std B" panose="02020700000000000000" pitchFamily="18" charset="-128"/>
-                <a:ea typeface="FOT-Skip Std B" panose="02020700000000000000" pitchFamily="18" charset="-128"/>
-              </a:endParaRPr>
-            </a:p>
-          </p:txBody>
-        </p:sp>
+                    <a:latin typeface="FOT-Skip Std B" panose="02020700000000000000" pitchFamily="18" charset="-128"/>
+                    <a:ea typeface="FOT-Skip Std B" panose="02020700000000000000" pitchFamily="18" charset="-128"/>
+                  </a:rPr>
+                  <a:t>文</a:t>
+                </a:r>
+              </a:p>
+            </p:txBody>
+          </p:sp>
+        </p:grpSp>
       </p:grpSp>
     </p:spTree>
     <p:extLst>
@@ -7191,6 +6924,297 @@
 </p:sld>
 </file>
 
+<file path=ppt/slides/slide3.xml><?xml version="1.0" encoding="utf-8"?>
+<p:sld xmlns:a="http://schemas.openxmlformats.org/drawingml/2006/main" xmlns:r="http://schemas.openxmlformats.org/officeDocument/2006/relationships" xmlns:p="http://schemas.openxmlformats.org/presentationml/2006/main">
+  <p:cSld>
+    <p:spTree>
+      <p:nvGrpSpPr>
+        <p:cNvPr id="1" name=""/>
+        <p:cNvGrpSpPr/>
+        <p:nvPr/>
+      </p:nvGrpSpPr>
+      <p:grpSpPr>
+        <a:xfrm>
+          <a:off x="0" y="0"/>
+          <a:ext cx="0" cy="0"/>
+          <a:chOff x="0" y="0"/>
+          <a:chExt cx="0" cy="0"/>
+        </a:xfrm>
+      </p:grpSpPr>
+      <p:grpSp>
+        <p:nvGrpSpPr>
+          <p:cNvPr id="9" name="群組 8"/>
+          <p:cNvGrpSpPr/>
+          <p:nvPr/>
+        </p:nvGrpSpPr>
+        <p:grpSpPr>
+          <a:xfrm>
+            <a:off x="560507" y="667657"/>
+            <a:ext cx="10058400" cy="5729765"/>
+            <a:chOff x="560507" y="667657"/>
+            <a:chExt cx="10058400" cy="5729765"/>
+          </a:xfrm>
+        </p:grpSpPr>
+        <p:pic>
+          <p:nvPicPr>
+            <p:cNvPr id="4" name="圖片 3"/>
+            <p:cNvPicPr>
+              <a:picLocks noChangeAspect="1"/>
+            </p:cNvPicPr>
+            <p:nvPr/>
+          </p:nvPicPr>
+          <p:blipFill>
+            <a:blip r:embed="rId2">
+              <a:extLst>
+                <a:ext uri="{28A0092B-C50C-407E-A947-70E740481C1C}">
+                  <a14:useLocalDpi xmlns:a14="http://schemas.microsoft.com/office/drawing/2010/main" val="0"/>
+                </a:ext>
+              </a:extLst>
+            </a:blip>
+            <a:stretch>
+              <a:fillRect/>
+            </a:stretch>
+          </p:blipFill>
+          <p:spPr>
+            <a:xfrm>
+              <a:off x="560507" y="667657"/>
+              <a:ext cx="10058400" cy="5729765"/>
+            </a:xfrm>
+            <a:prstGeom prst="rect">
+              <a:avLst/>
+            </a:prstGeom>
+          </p:spPr>
+        </p:pic>
+        <p:grpSp>
+          <p:nvGrpSpPr>
+            <p:cNvPr id="5" name="群組 4"/>
+            <p:cNvGrpSpPr/>
+            <p:nvPr/>
+          </p:nvGrpSpPr>
+          <p:grpSpPr>
+            <a:xfrm>
+              <a:off x="1657570" y="2809264"/>
+              <a:ext cx="7864273" cy="1446550"/>
+              <a:chOff x="2972238" y="2697804"/>
+              <a:chExt cx="4643045" cy="1446550"/>
+            </a:xfrm>
+          </p:grpSpPr>
+          <p:sp>
+            <p:nvSpPr>
+              <p:cNvPr id="6" name="向右箭號 5"/>
+              <p:cNvSpPr/>
+              <p:nvPr/>
+            </p:nvSpPr>
+            <p:spPr>
+              <a:xfrm>
+                <a:off x="6734629" y="3113494"/>
+                <a:ext cx="880654" cy="615168"/>
+              </a:xfrm>
+              <a:prstGeom prst="rightArrow">
+                <a:avLst>
+                  <a:gd name="adj1" fmla="val 51587"/>
+                  <a:gd name="adj2" fmla="val 66218"/>
+                </a:avLst>
+              </a:prstGeom>
+              <a:solidFill>
+                <a:schemeClr val="tx2">
+                  <a:lumMod val="75000"/>
+                </a:schemeClr>
+              </a:solidFill>
+              <a:scene3d>
+                <a:camera prst="orthographicFront"/>
+                <a:lightRig rig="threePt" dir="t"/>
+              </a:scene3d>
+              <a:sp3d>
+                <a:bevelT prst="angle"/>
+              </a:sp3d>
+            </p:spPr>
+            <p:style>
+              <a:lnRef idx="2">
+                <a:schemeClr val="dk1">
+                  <a:shade val="50000"/>
+                </a:schemeClr>
+              </a:lnRef>
+              <a:fillRef idx="1">
+                <a:schemeClr val="dk1"/>
+              </a:fillRef>
+              <a:effectRef idx="0">
+                <a:schemeClr val="dk1"/>
+              </a:effectRef>
+              <a:fontRef idx="minor">
+                <a:schemeClr val="lt1"/>
+              </a:fontRef>
+            </p:style>
+            <p:txBody>
+              <a:bodyPr rtlCol="0" anchor="ctr"/>
+              <a:lstStyle/>
+              <a:p>
+                <a:pPr algn="ctr"/>
+                <a:endParaRPr lang="zh-TW" altLang="en-US"/>
+              </a:p>
+            </p:txBody>
+          </p:sp>
+          <p:sp>
+            <p:nvSpPr>
+              <p:cNvPr id="7" name="向右箭號 6"/>
+              <p:cNvSpPr/>
+              <p:nvPr/>
+            </p:nvSpPr>
+            <p:spPr>
+              <a:xfrm flipH="1">
+                <a:off x="2972238" y="3113494"/>
+                <a:ext cx="880654" cy="615168"/>
+              </a:xfrm>
+              <a:prstGeom prst="rightArrow">
+                <a:avLst>
+                  <a:gd name="adj1" fmla="val 51587"/>
+                  <a:gd name="adj2" fmla="val 66218"/>
+                </a:avLst>
+              </a:prstGeom>
+              <a:solidFill>
+                <a:schemeClr val="tx2">
+                  <a:lumMod val="75000"/>
+                </a:schemeClr>
+              </a:solidFill>
+              <a:scene3d>
+                <a:camera prst="orthographicFront"/>
+                <a:lightRig rig="threePt" dir="t"/>
+              </a:scene3d>
+              <a:sp3d>
+                <a:bevelT prst="angle"/>
+              </a:sp3d>
+            </p:spPr>
+            <p:style>
+              <a:lnRef idx="2">
+                <a:schemeClr val="dk1">
+                  <a:shade val="50000"/>
+                </a:schemeClr>
+              </a:lnRef>
+              <a:fillRef idx="1">
+                <a:schemeClr val="dk1"/>
+              </a:fillRef>
+              <a:effectRef idx="0">
+                <a:schemeClr val="dk1"/>
+              </a:effectRef>
+              <a:fontRef idx="minor">
+                <a:schemeClr val="lt1"/>
+              </a:fontRef>
+            </p:style>
+            <p:txBody>
+              <a:bodyPr rtlCol="0" anchor="ctr"/>
+              <a:lstStyle/>
+              <a:p>
+                <a:pPr algn="ctr"/>
+                <a:endParaRPr lang="zh-TW" altLang="en-US"/>
+              </a:p>
+            </p:txBody>
+          </p:sp>
+          <p:sp>
+            <p:nvSpPr>
+              <p:cNvPr id="8" name="文字方塊 7"/>
+              <p:cNvSpPr txBox="1"/>
+              <p:nvPr/>
+            </p:nvSpPr>
+            <p:spPr>
+              <a:xfrm>
+                <a:off x="3852892" y="2697804"/>
+                <a:ext cx="2881737" cy="1446550"/>
+              </a:xfrm>
+              <a:prstGeom prst="rect">
+                <a:avLst/>
+              </a:prstGeom>
+              <a:noFill/>
+            </p:spPr>
+            <p:txBody>
+              <a:bodyPr wrap="square" rtlCol="0" anchor="ctr">
+                <a:spAutoFit/>
+              </a:bodyPr>
+              <a:lstStyle/>
+              <a:p>
+                <a:pPr algn="ctr"/>
+                <a:r>
+                  <a:rPr lang="en-US" altLang="zh-TW" sz="4400" dirty="0" smtClean="0">
+                    <a:ln>
+                      <a:solidFill>
+                        <a:schemeClr val="bg1">
+                          <a:lumMod val="50000"/>
+                        </a:schemeClr>
+                      </a:solidFill>
+                    </a:ln>
+                    <a:solidFill>
+                      <a:schemeClr val="bg1"/>
+                    </a:solidFill>
+                    <a:latin typeface="FOT-Skip Std B" panose="02020700000000000000" pitchFamily="18" charset="-128"/>
+                    <a:ea typeface="FOT-Skip Std B" panose="02020700000000000000" pitchFamily="18" charset="-128"/>
+                  </a:rPr>
+                  <a:t>1920</a:t>
+                </a:r>
+                <a:r>
+                  <a:rPr lang="zh-TW" altLang="en-US" sz="4400" dirty="0" smtClean="0">
+                    <a:ln>
+                      <a:solidFill>
+                        <a:schemeClr val="bg1">
+                          <a:lumMod val="50000"/>
+                        </a:schemeClr>
+                      </a:solidFill>
+                    </a:ln>
+                    <a:solidFill>
+                      <a:schemeClr val="bg1"/>
+                    </a:solidFill>
+                    <a:latin typeface="FOT-Skip Std B" panose="02020700000000000000" pitchFamily="18" charset="-128"/>
+                    <a:ea typeface="FOT-Skip Std B" panose="02020700000000000000" pitchFamily="18" charset="-128"/>
+                  </a:rPr>
+                  <a:t> </a:t>
+                </a:r>
+                <a:r>
+                  <a:rPr lang="en-US" altLang="zh-TW" sz="4400" dirty="0" smtClean="0">
+                    <a:ln>
+                      <a:solidFill>
+                        <a:schemeClr val="bg1">
+                          <a:lumMod val="50000"/>
+                        </a:schemeClr>
+                      </a:solidFill>
+                    </a:ln>
+                    <a:solidFill>
+                      <a:schemeClr val="bg1"/>
+                    </a:solidFill>
+                    <a:latin typeface="FOT-Skip Std B" panose="02020700000000000000" pitchFamily="18" charset="-128"/>
+                    <a:ea typeface="FOT-Skip Std B" panose="02020700000000000000" pitchFamily="18" charset="-128"/>
+                  </a:rPr>
+                  <a:t>x1080</a:t>
+                </a:r>
+                <a:endParaRPr lang="zh-TW" altLang="en-US" sz="4400" dirty="0">
+                  <a:ln>
+                    <a:solidFill>
+                      <a:schemeClr val="bg1">
+                        <a:lumMod val="50000"/>
+                      </a:schemeClr>
+                    </a:solidFill>
+                  </a:ln>
+                  <a:solidFill>
+                    <a:schemeClr val="bg1"/>
+                  </a:solidFill>
+                  <a:latin typeface="FOT-Skip Std B" panose="02020700000000000000" pitchFamily="18" charset="-128"/>
+                  <a:ea typeface="FOT-Skip Std B" panose="02020700000000000000" pitchFamily="18" charset="-128"/>
+                </a:endParaRPr>
+              </a:p>
+            </p:txBody>
+          </p:sp>
+        </p:grpSp>
+      </p:grpSp>
+    </p:spTree>
+    <p:extLst>
+      <p:ext uri="{BB962C8B-B14F-4D97-AF65-F5344CB8AC3E}">
+        <p14:creationId xmlns:p14="http://schemas.microsoft.com/office/powerpoint/2010/main" val="1323591113"/>
+      </p:ext>
+    </p:extLst>
+  </p:cSld>
+  <p:clrMapOvr>
+    <a:masterClrMapping/>
+  </p:clrMapOvr>
+</p:sld>
+</file>
+
 <file path=ppt/theme/theme1.xml><?xml version="1.0" encoding="utf-8"?>
 <a:theme xmlns:a="http://schemas.openxmlformats.org/drawingml/2006/main" name="Office 佈景主題">
   <a:themeElements>

</xml_diff>

<commit_message>
OptionSwitch : 80 % Optimize some code
</commit_message>
<xml_diff>
--- a/Preview Images/drawboard.pptx
+++ b/Preview Images/drawboard.pptx
@@ -245,7 +245,7 @@
           <a:p>
             <a:fld id="{628A46F5-8AEF-4E68-9DE5-F9F420B16F36}" type="datetimeFigureOut">
               <a:rPr lang="zh-TW" altLang="en-US" smtClean="0"/>
-              <a:t>2019/6/3</a:t>
+              <a:t>2019/6/8</a:t>
             </a:fld>
             <a:endParaRPr lang="zh-TW" altLang="en-US"/>
           </a:p>
@@ -415,7 +415,7 @@
           <a:p>
             <a:fld id="{628A46F5-8AEF-4E68-9DE5-F9F420B16F36}" type="datetimeFigureOut">
               <a:rPr lang="zh-TW" altLang="en-US" smtClean="0"/>
-              <a:t>2019/6/3</a:t>
+              <a:t>2019/6/8</a:t>
             </a:fld>
             <a:endParaRPr lang="zh-TW" altLang="en-US"/>
           </a:p>
@@ -595,7 +595,7 @@
           <a:p>
             <a:fld id="{628A46F5-8AEF-4E68-9DE5-F9F420B16F36}" type="datetimeFigureOut">
               <a:rPr lang="zh-TW" altLang="en-US" smtClean="0"/>
-              <a:t>2019/6/3</a:t>
+              <a:t>2019/6/8</a:t>
             </a:fld>
             <a:endParaRPr lang="zh-TW" altLang="en-US"/>
           </a:p>
@@ -765,7 +765,7 @@
           <a:p>
             <a:fld id="{628A46F5-8AEF-4E68-9DE5-F9F420B16F36}" type="datetimeFigureOut">
               <a:rPr lang="zh-TW" altLang="en-US" smtClean="0"/>
-              <a:t>2019/6/3</a:t>
+              <a:t>2019/6/8</a:t>
             </a:fld>
             <a:endParaRPr lang="zh-TW" altLang="en-US"/>
           </a:p>
@@ -1011,7 +1011,7 @@
           <a:p>
             <a:fld id="{628A46F5-8AEF-4E68-9DE5-F9F420B16F36}" type="datetimeFigureOut">
               <a:rPr lang="zh-TW" altLang="en-US" smtClean="0"/>
-              <a:t>2019/6/3</a:t>
+              <a:t>2019/6/8</a:t>
             </a:fld>
             <a:endParaRPr lang="zh-TW" altLang="en-US"/>
           </a:p>
@@ -1243,7 +1243,7 @@
           <a:p>
             <a:fld id="{628A46F5-8AEF-4E68-9DE5-F9F420B16F36}" type="datetimeFigureOut">
               <a:rPr lang="zh-TW" altLang="en-US" smtClean="0"/>
-              <a:t>2019/6/3</a:t>
+              <a:t>2019/6/8</a:t>
             </a:fld>
             <a:endParaRPr lang="zh-TW" altLang="en-US"/>
           </a:p>
@@ -1610,7 +1610,7 @@
           <a:p>
             <a:fld id="{628A46F5-8AEF-4E68-9DE5-F9F420B16F36}" type="datetimeFigureOut">
               <a:rPr lang="zh-TW" altLang="en-US" smtClean="0"/>
-              <a:t>2019/6/3</a:t>
+              <a:t>2019/6/8</a:t>
             </a:fld>
             <a:endParaRPr lang="zh-TW" altLang="en-US"/>
           </a:p>
@@ -1728,7 +1728,7 @@
           <a:p>
             <a:fld id="{628A46F5-8AEF-4E68-9DE5-F9F420B16F36}" type="datetimeFigureOut">
               <a:rPr lang="zh-TW" altLang="en-US" smtClean="0"/>
-              <a:t>2019/6/3</a:t>
+              <a:t>2019/6/8</a:t>
             </a:fld>
             <a:endParaRPr lang="zh-TW" altLang="en-US"/>
           </a:p>
@@ -1823,7 +1823,7 @@
           <a:p>
             <a:fld id="{628A46F5-8AEF-4E68-9DE5-F9F420B16F36}" type="datetimeFigureOut">
               <a:rPr lang="zh-TW" altLang="en-US" smtClean="0"/>
-              <a:t>2019/6/3</a:t>
+              <a:t>2019/6/8</a:t>
             </a:fld>
             <a:endParaRPr lang="zh-TW" altLang="en-US"/>
           </a:p>
@@ -2100,7 +2100,7 @@
           <a:p>
             <a:fld id="{628A46F5-8AEF-4E68-9DE5-F9F420B16F36}" type="datetimeFigureOut">
               <a:rPr lang="zh-TW" altLang="en-US" smtClean="0"/>
-              <a:t>2019/6/3</a:t>
+              <a:t>2019/6/8</a:t>
             </a:fld>
             <a:endParaRPr lang="zh-TW" altLang="en-US"/>
           </a:p>
@@ -2353,7 +2353,7 @@
           <a:p>
             <a:fld id="{628A46F5-8AEF-4E68-9DE5-F9F420B16F36}" type="datetimeFigureOut">
               <a:rPr lang="zh-TW" altLang="en-US" smtClean="0"/>
-              <a:t>2019/6/3</a:t>
+              <a:t>2019/6/8</a:t>
             </a:fld>
             <a:endParaRPr lang="zh-TW" altLang="en-US"/>
           </a:p>
@@ -2566,7 +2566,7 @@
           <a:p>
             <a:fld id="{628A46F5-8AEF-4E68-9DE5-F9F420B16F36}" type="datetimeFigureOut">
               <a:rPr lang="zh-TW" altLang="en-US" smtClean="0"/>
-              <a:t>2019/6/3</a:t>
+              <a:t>2019/6/8</a:t>
             </a:fld>
             <a:endParaRPr lang="zh-TW" altLang="en-US"/>
           </a:p>
@@ -3201,6 +3201,226 @@
           </p:sp>
         </p:grpSp>
       </p:grpSp>
+      <p:sp>
+        <p:nvSpPr>
+          <p:cNvPr id="8" name="向右箭號 7"/>
+          <p:cNvSpPr/>
+          <p:nvPr/>
+        </p:nvSpPr>
+        <p:spPr>
+          <a:xfrm>
+            <a:off x="8947767" y="0"/>
+            <a:ext cx="880654" cy="615168"/>
+          </a:xfrm>
+          <a:prstGeom prst="rightArrow">
+            <a:avLst>
+              <a:gd name="adj1" fmla="val 51587"/>
+              <a:gd name="adj2" fmla="val 66218"/>
+            </a:avLst>
+          </a:prstGeom>
+          <a:solidFill>
+            <a:schemeClr val="tx2">
+              <a:lumMod val="75000"/>
+            </a:schemeClr>
+          </a:solidFill>
+          <a:scene3d>
+            <a:camera prst="orthographicFront"/>
+            <a:lightRig rig="threePt" dir="t"/>
+          </a:scene3d>
+          <a:sp3d>
+            <a:bevelT prst="angle"/>
+          </a:sp3d>
+        </p:spPr>
+        <p:style>
+          <a:lnRef idx="2">
+            <a:schemeClr val="dk1">
+              <a:shade val="50000"/>
+            </a:schemeClr>
+          </a:lnRef>
+          <a:fillRef idx="1">
+            <a:schemeClr val="dk1"/>
+          </a:fillRef>
+          <a:effectRef idx="0">
+            <a:schemeClr val="dk1"/>
+          </a:effectRef>
+          <a:fontRef idx="minor">
+            <a:schemeClr val="lt1"/>
+          </a:fontRef>
+        </p:style>
+        <p:txBody>
+          <a:bodyPr rtlCol="0" anchor="ctr"/>
+          <a:lstStyle/>
+          <a:p>
+            <a:pPr algn="ctr"/>
+            <a:endParaRPr lang="zh-TW" altLang="en-US"/>
+          </a:p>
+        </p:txBody>
+      </p:sp>
+      <p:sp>
+        <p:nvSpPr>
+          <p:cNvPr id="9" name="向右箭號 8"/>
+          <p:cNvSpPr/>
+          <p:nvPr/>
+        </p:nvSpPr>
+        <p:spPr>
+          <a:xfrm flipH="1">
+            <a:off x="5185376" y="0"/>
+            <a:ext cx="880654" cy="615168"/>
+          </a:xfrm>
+          <a:prstGeom prst="rightArrow">
+            <a:avLst>
+              <a:gd name="adj1" fmla="val 51587"/>
+              <a:gd name="adj2" fmla="val 66218"/>
+            </a:avLst>
+          </a:prstGeom>
+          <a:solidFill>
+            <a:schemeClr val="tx2">
+              <a:lumMod val="75000"/>
+            </a:schemeClr>
+          </a:solidFill>
+          <a:scene3d>
+            <a:camera prst="orthographicFront"/>
+            <a:lightRig rig="threePt" dir="t"/>
+          </a:scene3d>
+          <a:sp3d>
+            <a:bevelT prst="angle"/>
+          </a:sp3d>
+        </p:spPr>
+        <p:style>
+          <a:lnRef idx="2">
+            <a:schemeClr val="dk1">
+              <a:shade val="50000"/>
+            </a:schemeClr>
+          </a:lnRef>
+          <a:fillRef idx="1">
+            <a:schemeClr val="dk1"/>
+          </a:fillRef>
+          <a:effectRef idx="0">
+            <a:schemeClr val="dk1"/>
+          </a:effectRef>
+          <a:fontRef idx="minor">
+            <a:schemeClr val="lt1"/>
+          </a:fontRef>
+        </p:style>
+        <p:txBody>
+          <a:bodyPr rtlCol="0" anchor="ctr"/>
+          <a:lstStyle/>
+          <a:p>
+            <a:pPr algn="ctr"/>
+            <a:endParaRPr lang="zh-TW" altLang="en-US"/>
+          </a:p>
+        </p:txBody>
+      </p:sp>
+      <p:sp>
+        <p:nvSpPr>
+          <p:cNvPr id="10" name="向右箭號 9"/>
+          <p:cNvSpPr/>
+          <p:nvPr/>
+        </p:nvSpPr>
+        <p:spPr>
+          <a:xfrm>
+            <a:off x="3882571" y="0"/>
+            <a:ext cx="880654" cy="615168"/>
+          </a:xfrm>
+          <a:prstGeom prst="rightArrow">
+            <a:avLst>
+              <a:gd name="adj1" fmla="val 51587"/>
+              <a:gd name="adj2" fmla="val 66218"/>
+            </a:avLst>
+          </a:prstGeom>
+          <a:solidFill>
+            <a:schemeClr val="accent1">
+              <a:lumMod val="75000"/>
+            </a:schemeClr>
+          </a:solidFill>
+          <a:scene3d>
+            <a:camera prst="orthographicFront"/>
+            <a:lightRig rig="threePt" dir="t"/>
+          </a:scene3d>
+          <a:sp3d>
+            <a:bevelT prst="angle"/>
+          </a:sp3d>
+        </p:spPr>
+        <p:style>
+          <a:lnRef idx="2">
+            <a:schemeClr val="dk1">
+              <a:shade val="50000"/>
+            </a:schemeClr>
+          </a:lnRef>
+          <a:fillRef idx="1">
+            <a:schemeClr val="dk1"/>
+          </a:fillRef>
+          <a:effectRef idx="0">
+            <a:schemeClr val="dk1"/>
+          </a:effectRef>
+          <a:fontRef idx="minor">
+            <a:schemeClr val="lt1"/>
+          </a:fontRef>
+        </p:style>
+        <p:txBody>
+          <a:bodyPr rtlCol="0" anchor="ctr"/>
+          <a:lstStyle/>
+          <a:p>
+            <a:pPr algn="ctr"/>
+            <a:endParaRPr lang="zh-TW" altLang="en-US"/>
+          </a:p>
+        </p:txBody>
+      </p:sp>
+      <p:sp>
+        <p:nvSpPr>
+          <p:cNvPr id="11" name="向右箭號 10"/>
+          <p:cNvSpPr/>
+          <p:nvPr/>
+        </p:nvSpPr>
+        <p:spPr>
+          <a:xfrm flipH="1">
+            <a:off x="120180" y="0"/>
+            <a:ext cx="880654" cy="615168"/>
+          </a:xfrm>
+          <a:prstGeom prst="rightArrow">
+            <a:avLst>
+              <a:gd name="adj1" fmla="val 51587"/>
+              <a:gd name="adj2" fmla="val 66218"/>
+            </a:avLst>
+          </a:prstGeom>
+          <a:solidFill>
+            <a:schemeClr val="accent1">
+              <a:lumMod val="75000"/>
+            </a:schemeClr>
+          </a:solidFill>
+          <a:scene3d>
+            <a:camera prst="orthographicFront"/>
+            <a:lightRig rig="threePt" dir="t"/>
+          </a:scene3d>
+          <a:sp3d>
+            <a:bevelT prst="angle"/>
+          </a:sp3d>
+        </p:spPr>
+        <p:style>
+          <a:lnRef idx="2">
+            <a:schemeClr val="dk1">
+              <a:shade val="50000"/>
+            </a:schemeClr>
+          </a:lnRef>
+          <a:fillRef idx="1">
+            <a:schemeClr val="dk1"/>
+          </a:fillRef>
+          <a:effectRef idx="0">
+            <a:schemeClr val="dk1"/>
+          </a:effectRef>
+          <a:fontRef idx="minor">
+            <a:schemeClr val="lt1"/>
+          </a:fontRef>
+        </p:style>
+        <p:txBody>
+          <a:bodyPr rtlCol="0" anchor="ctr"/>
+          <a:lstStyle/>
+          <a:p>
+            <a:pPr algn="ctr"/>
+            <a:endParaRPr lang="zh-TW" altLang="en-US"/>
+          </a:p>
+        </p:txBody>
+      </p:sp>
     </p:spTree>
     <p:extLst>
       <p:ext uri="{BB962C8B-B14F-4D97-AF65-F5344CB8AC3E}">

</xml_diff>